<commit_message>
Report,presentation & notebook submission
</commit_message>
<xml_diff>
--- a/Best_location_for_a_car_rental_agency_in_Paris.pptx
+++ b/Best_location_for_a_car_rental_agency_in_Paris.pptx
@@ -303,7 +303,7 @@
           <a:p>
             <a:fld id="{B0606EDC-9FEB-40E9-ADAF-B5B7C356C012}" type="datetimeFigureOut">
               <a:rPr lang="fr-FR" smtClean="0"/>
-              <a:t>18/08/2020</a:t>
+              <a:t>19/08/2020</a:t>
             </a:fld>
             <a:endParaRPr lang="fr-FR"/>
           </a:p>
@@ -578,7 +578,7 @@
           <a:p>
             <a:fld id="{B0606EDC-9FEB-40E9-ADAF-B5B7C356C012}" type="datetimeFigureOut">
               <a:rPr lang="fr-FR" smtClean="0"/>
-              <a:t>18/08/2020</a:t>
+              <a:t>19/08/2020</a:t>
             </a:fld>
             <a:endParaRPr lang="fr-FR"/>
           </a:p>
@@ -772,7 +772,7 @@
           <a:p>
             <a:fld id="{B0606EDC-9FEB-40E9-ADAF-B5B7C356C012}" type="datetimeFigureOut">
               <a:rPr lang="fr-FR" smtClean="0"/>
-              <a:t>18/08/2020</a:t>
+              <a:t>19/08/2020</a:t>
             </a:fld>
             <a:endParaRPr lang="fr-FR"/>
           </a:p>
@@ -1040,7 +1040,7 @@
           <a:p>
             <a:fld id="{B0606EDC-9FEB-40E9-ADAF-B5B7C356C012}" type="datetimeFigureOut">
               <a:rPr lang="fr-FR" smtClean="0"/>
-              <a:t>18/08/2020</a:t>
+              <a:t>19/08/2020</a:t>
             </a:fld>
             <a:endParaRPr lang="fr-FR"/>
           </a:p>
@@ -1372,7 +1372,7 @@
           <a:p>
             <a:fld id="{B0606EDC-9FEB-40E9-ADAF-B5B7C356C012}" type="datetimeFigureOut">
               <a:rPr lang="fr-FR" smtClean="0"/>
-              <a:t>18/08/2020</a:t>
+              <a:t>19/08/2020</a:t>
             </a:fld>
             <a:endParaRPr lang="fr-FR"/>
           </a:p>
@@ -1982,7 +1982,7 @@
           <a:p>
             <a:fld id="{B0606EDC-9FEB-40E9-ADAF-B5B7C356C012}" type="datetimeFigureOut">
               <a:rPr lang="fr-FR" smtClean="0"/>
-              <a:t>18/08/2020</a:t>
+              <a:t>19/08/2020</a:t>
             </a:fld>
             <a:endParaRPr lang="fr-FR"/>
           </a:p>
@@ -2829,7 +2829,7 @@
           <a:p>
             <a:fld id="{B0606EDC-9FEB-40E9-ADAF-B5B7C356C012}" type="datetimeFigureOut">
               <a:rPr lang="fr-FR" smtClean="0"/>
-              <a:t>18/08/2020</a:t>
+              <a:t>19/08/2020</a:t>
             </a:fld>
             <a:endParaRPr lang="fr-FR"/>
           </a:p>
@@ -2999,7 +2999,7 @@
           <a:p>
             <a:fld id="{B0606EDC-9FEB-40E9-ADAF-B5B7C356C012}" type="datetimeFigureOut">
               <a:rPr lang="fr-FR" smtClean="0"/>
-              <a:t>18/08/2020</a:t>
+              <a:t>19/08/2020</a:t>
             </a:fld>
             <a:endParaRPr lang="fr-FR"/>
           </a:p>
@@ -3179,7 +3179,7 @@
           <a:p>
             <a:fld id="{B0606EDC-9FEB-40E9-ADAF-B5B7C356C012}" type="datetimeFigureOut">
               <a:rPr lang="fr-FR" smtClean="0"/>
-              <a:t>18/08/2020</a:t>
+              <a:t>19/08/2020</a:t>
             </a:fld>
             <a:endParaRPr lang="fr-FR"/>
           </a:p>
@@ -3349,7 +3349,7 @@
           <a:p>
             <a:fld id="{B0606EDC-9FEB-40E9-ADAF-B5B7C356C012}" type="datetimeFigureOut">
               <a:rPr lang="fr-FR" smtClean="0"/>
-              <a:t>18/08/2020</a:t>
+              <a:t>19/08/2020</a:t>
             </a:fld>
             <a:endParaRPr lang="fr-FR"/>
           </a:p>
@@ -3593,7 +3593,7 @@
           <a:p>
             <a:fld id="{B0606EDC-9FEB-40E9-ADAF-B5B7C356C012}" type="datetimeFigureOut">
               <a:rPr lang="fr-FR" smtClean="0"/>
-              <a:t>18/08/2020</a:t>
+              <a:t>19/08/2020</a:t>
             </a:fld>
             <a:endParaRPr lang="fr-FR"/>
           </a:p>
@@ -3885,7 +3885,7 @@
           <a:p>
             <a:fld id="{B0606EDC-9FEB-40E9-ADAF-B5B7C356C012}" type="datetimeFigureOut">
               <a:rPr lang="fr-FR" smtClean="0"/>
-              <a:t>18/08/2020</a:t>
+              <a:t>19/08/2020</a:t>
             </a:fld>
             <a:endParaRPr lang="fr-FR"/>
           </a:p>
@@ -4323,7 +4323,7 @@
           <a:p>
             <a:fld id="{B0606EDC-9FEB-40E9-ADAF-B5B7C356C012}" type="datetimeFigureOut">
               <a:rPr lang="fr-FR" smtClean="0"/>
-              <a:t>18/08/2020</a:t>
+              <a:t>19/08/2020</a:t>
             </a:fld>
             <a:endParaRPr lang="fr-FR"/>
           </a:p>
@@ -4441,7 +4441,7 @@
           <a:p>
             <a:fld id="{B0606EDC-9FEB-40E9-ADAF-B5B7C356C012}" type="datetimeFigureOut">
               <a:rPr lang="fr-FR" smtClean="0"/>
-              <a:t>18/08/2020</a:t>
+              <a:t>19/08/2020</a:t>
             </a:fld>
             <a:endParaRPr lang="fr-FR"/>
           </a:p>
@@ -4536,7 +4536,7 @@
           <a:p>
             <a:fld id="{B0606EDC-9FEB-40E9-ADAF-B5B7C356C012}" type="datetimeFigureOut">
               <a:rPr lang="fr-FR" smtClean="0"/>
-              <a:t>18/08/2020</a:t>
+              <a:t>19/08/2020</a:t>
             </a:fld>
             <a:endParaRPr lang="fr-FR"/>
           </a:p>
@@ -4815,7 +4815,7 @@
           <a:p>
             <a:fld id="{B0606EDC-9FEB-40E9-ADAF-B5B7C356C012}" type="datetimeFigureOut">
               <a:rPr lang="fr-FR" smtClean="0"/>
-              <a:t>18/08/2020</a:t>
+              <a:t>19/08/2020</a:t>
             </a:fld>
             <a:endParaRPr lang="fr-FR"/>
           </a:p>
@@ -5090,7 +5090,7 @@
           <a:p>
             <a:fld id="{B0606EDC-9FEB-40E9-ADAF-B5B7C356C012}" type="datetimeFigureOut">
               <a:rPr lang="fr-FR" smtClean="0"/>
-              <a:t>18/08/2020</a:t>
+              <a:t>19/08/2020</a:t>
             </a:fld>
             <a:endParaRPr lang="fr-FR"/>
           </a:p>
@@ -5519,7 +5519,7 @@
           <a:p>
             <a:fld id="{B0606EDC-9FEB-40E9-ADAF-B5B7C356C012}" type="datetimeFigureOut">
               <a:rPr lang="fr-FR" smtClean="0"/>
-              <a:t>18/08/2020</a:t>
+              <a:t>19/08/2020</a:t>
             </a:fld>
             <a:endParaRPr lang="fr-FR"/>
           </a:p>
@@ -7273,15 +7273,7 @@
             </a:r>
             <a:r>
               <a:rPr lang="fr-FR" dirty="0"/>
-              <a:t> chose to </a:t>
-            </a:r>
-            <a:r>
-              <a:rPr lang="fr-FR" dirty="0" err="1"/>
-              <a:t>locate</a:t>
-            </a:r>
-            <a:r>
-              <a:rPr lang="fr-FR" dirty="0"/>
-              <a:t> a </a:t>
+              <a:t> chose to open a </a:t>
             </a:r>
             <a:r>
               <a:rPr lang="fr-FR" dirty="0" err="1"/>

</xml_diff>